<commit_message>
Capstone Poster Presentation, pretty much complete just need some editing, ask Powell to review tomorrow
</commit_message>
<xml_diff>
--- a/Capstone Poster Presentation.pptx
+++ b/Capstone Poster Presentation.pptx
@@ -3232,7 +3232,7 @@
         <p:spPr>
           <a:xfrm>
             <a:off x="152400" y="9525001"/>
-            <a:ext cx="10820400" cy="5816977"/>
+            <a:ext cx="10820400" cy="3739485"/>
           </a:xfrm>
           <a:prstGeom prst="rect">
             <a:avLst/>
@@ -3257,8 +3257,8 @@
               <a:buChar char="•"/>
             </a:pPr>
             <a:r>
-              <a:rPr lang="en-US" dirty="0"/>
-              <a:t>Package deliveries increased in response to COVID-19 pandemic and shutdowns</a:t>
+              <a:rPr lang="en-US" sz="5700" dirty="0"/>
+              <a:t>Package deliveries increased in response to COVID-19</a:t>
             </a:r>
           </a:p>
           <a:p>
@@ -3267,8 +3267,8 @@
               <a:buChar char="•"/>
             </a:pPr>
             <a:r>
-              <a:rPr lang="en-US" dirty="0"/>
-              <a:t>This was followed by increasing package theft</a:t>
+              <a:rPr lang="en-US" sz="5700" dirty="0"/>
+              <a:t>Increased package theft followed</a:t>
             </a:r>
           </a:p>
         </p:txBody>
@@ -3288,7 +3288,7 @@
         <p:spPr>
           <a:xfrm>
             <a:off x="10972800" y="9448800"/>
-            <a:ext cx="10820400" cy="5816977"/>
+            <a:ext cx="10820400" cy="4555093"/>
           </a:xfrm>
           <a:prstGeom prst="rect">
             <a:avLst/>
@@ -3312,8 +3312,8 @@
               <a:buChar char="•"/>
             </a:pPr>
             <a:r>
-              <a:rPr lang="en-US" dirty="0"/>
-              <a:t>Provide a solution that facilitates communication between users and package delivery services to effectively eliminate porch piracy</a:t>
+              <a:rPr lang="en-US" sz="5700" dirty="0"/>
+              <a:t>Facilitate communication between users and package delivery services to effectively eliminate porch piracy</a:t>
             </a:r>
           </a:p>
         </p:txBody>
@@ -3332,8 +3332,8 @@
         </p:nvSpPr>
         <p:spPr>
           <a:xfrm>
-            <a:off x="152400" y="15862490"/>
-            <a:ext cx="10820400" cy="3908762"/>
+            <a:off x="155944" y="13868400"/>
+            <a:ext cx="10820400" cy="3647152"/>
           </a:xfrm>
           <a:prstGeom prst="rect">
             <a:avLst/>
@@ -3358,7 +3358,7 @@
               <a:buChar char="•"/>
             </a:pPr>
             <a:r>
-              <a:rPr lang="en-US" dirty="0"/>
+              <a:rPr lang="en-US" sz="5700" dirty="0"/>
               <a:t>A locking system with multi-level user access, integrated camera, and web application</a:t>
             </a:r>
           </a:p>
@@ -3378,8 +3378,8 @@
         </p:nvSpPr>
         <p:spPr>
           <a:xfrm>
-            <a:off x="10972799" y="15862490"/>
-            <a:ext cx="10820400" cy="4862870"/>
+            <a:off x="10972800" y="13868400"/>
+            <a:ext cx="10820400" cy="3677930"/>
           </a:xfrm>
           <a:prstGeom prst="rect">
             <a:avLst/>
@@ -3403,14 +3403,884 @@
               <a:buChar char="•"/>
             </a:pPr>
             <a:r>
-              <a:rPr lang="en-US" dirty="0"/>
-              <a:t>New product development process, prototyping, and secure data transfer </a:t>
-            </a:r>
-            <a:r>
-              <a:rPr lang="en-US"/>
-              <a:t>and storage</a:t>
-            </a:r>
-            <a:endParaRPr lang="en-US" dirty="0"/>
+              <a:rPr lang="en-US" sz="5700" dirty="0"/>
+              <a:t>New product development, prototyping, and secure data transfer and storage</a:t>
+            </a:r>
+          </a:p>
+        </p:txBody>
+      </p:sp>
+      <p:pic>
+        <p:nvPicPr>
+          <p:cNvPr id="1028" name="Picture 4" descr="96BB2-056-F-EL | Keypads | Grayhill">
+            <a:extLst>
+              <a:ext uri="{FF2B5EF4-FFF2-40B4-BE49-F238E27FC236}">
+                <a16:creationId xmlns:a16="http://schemas.microsoft.com/office/drawing/2014/main" id="{AB6CC368-6683-4704-A98E-B1C9AB8141F4}"/>
+              </a:ext>
+            </a:extLst>
+          </p:cNvPr>
+          <p:cNvPicPr>
+            <a:picLocks noChangeAspect="1" noChangeArrowheads="1"/>
+          </p:cNvPicPr>
+          <p:nvPr/>
+        </p:nvPicPr>
+        <p:blipFill rotWithShape="1">
+          <a:blip r:embed="rId3">
+            <a:extLst>
+              <a:ext uri="{28A0092B-C50C-407E-A947-70E740481C1C}">
+                <a14:useLocalDpi xmlns:a14="http://schemas.microsoft.com/office/drawing/2010/main" val="0"/>
+              </a:ext>
+            </a:extLst>
+          </a:blip>
+          <a:srcRect l="19000" t="4450" r="23000" b="2667"/>
+          <a:stretch/>
+        </p:blipFill>
+        <p:spPr bwMode="auto">
+          <a:xfrm>
+            <a:off x="368753" y="19652318"/>
+            <a:ext cx="2610441" cy="3135306"/>
+          </a:xfrm>
+          <a:prstGeom prst="rect">
+            <a:avLst/>
+          </a:prstGeom>
+          <a:noFill/>
+          <a:extLst>
+            <a:ext uri="{909E8E84-426E-40DD-AFC4-6F175D3DCCD1}">
+              <a14:hiddenFill xmlns:a14="http://schemas.microsoft.com/office/drawing/2010/main">
+                <a:solidFill>
+                  <a:srgbClr val="FFFFFF"/>
+                </a:solidFill>
+              </a14:hiddenFill>
+            </a:ext>
+          </a:extLst>
+        </p:spPr>
+      </p:pic>
+      <p:pic>
+        <p:nvPicPr>
+          <p:cNvPr id="1030" name="Picture 6" descr="AWS Announces General Availability of Its Quantum Algorithm Design Service">
+            <a:extLst>
+              <a:ext uri="{FF2B5EF4-FFF2-40B4-BE49-F238E27FC236}">
+                <a16:creationId xmlns:a16="http://schemas.microsoft.com/office/drawing/2014/main" id="{E0FD3C99-186C-40D5-B46B-EF804AA20E84}"/>
+              </a:ext>
+            </a:extLst>
+          </p:cNvPr>
+          <p:cNvPicPr>
+            <a:picLocks noChangeAspect="1" noChangeArrowheads="1"/>
+          </p:cNvPicPr>
+          <p:nvPr/>
+        </p:nvPicPr>
+        <p:blipFill>
+          <a:blip r:embed="rId4" cstate="print">
+            <a:extLst>
+              <a:ext uri="{28A0092B-C50C-407E-A947-70E740481C1C}">
+                <a14:useLocalDpi xmlns:a14="http://schemas.microsoft.com/office/drawing/2010/main" val="0"/>
+              </a:ext>
+            </a:extLst>
+          </a:blip>
+          <a:srcRect/>
+          <a:stretch>
+            <a:fillRect/>
+          </a:stretch>
+        </p:blipFill>
+        <p:spPr bwMode="auto">
+          <a:xfrm>
+            <a:off x="11286636" y="24165327"/>
+            <a:ext cx="5054600" cy="3790950"/>
+          </a:xfrm>
+          <a:prstGeom prst="rect">
+            <a:avLst/>
+          </a:prstGeom>
+          <a:noFill/>
+          <a:extLst>
+            <a:ext uri="{909E8E84-426E-40DD-AFC4-6F175D3DCCD1}">
+              <a14:hiddenFill xmlns:a14="http://schemas.microsoft.com/office/drawing/2010/main">
+                <a:solidFill>
+                  <a:srgbClr val="FFFFFF"/>
+                </a:solidFill>
+              </a14:hiddenFill>
+            </a:ext>
+          </a:extLst>
+        </p:spPr>
+      </p:pic>
+      <p:pic>
+        <p:nvPicPr>
+          <p:cNvPr id="1032" name="Picture 8" descr="Raspberry Pi Camera Board v2.1 (8MP, 1080p) – Pi Supply">
+            <a:extLst>
+              <a:ext uri="{FF2B5EF4-FFF2-40B4-BE49-F238E27FC236}">
+                <a16:creationId xmlns:a16="http://schemas.microsoft.com/office/drawing/2014/main" id="{00080967-D09C-48A7-B59C-24B3C2F02E28}"/>
+              </a:ext>
+            </a:extLst>
+          </p:cNvPr>
+          <p:cNvPicPr>
+            <a:picLocks noChangeAspect="1" noChangeArrowheads="1"/>
+          </p:cNvPicPr>
+          <p:nvPr/>
+        </p:nvPicPr>
+        <p:blipFill rotWithShape="1">
+          <a:blip r:embed="rId5">
+            <a:extLst>
+              <a:ext uri="{28A0092B-C50C-407E-A947-70E740481C1C}">
+                <a14:useLocalDpi xmlns:a14="http://schemas.microsoft.com/office/drawing/2010/main" val="0"/>
+              </a:ext>
+            </a:extLst>
+          </a:blip>
+          <a:srcRect l="11964" t="16477" r="12019" b="18283"/>
+          <a:stretch/>
+        </p:blipFill>
+        <p:spPr bwMode="auto">
+          <a:xfrm>
+            <a:off x="470682" y="25220381"/>
+            <a:ext cx="2505408" cy="2150238"/>
+          </a:xfrm>
+          <a:prstGeom prst="rect">
+            <a:avLst/>
+          </a:prstGeom>
+          <a:noFill/>
+          <a:extLst>
+            <a:ext uri="{909E8E84-426E-40DD-AFC4-6F175D3DCCD1}">
+              <a14:hiddenFill xmlns:a14="http://schemas.microsoft.com/office/drawing/2010/main">
+                <a:solidFill>
+                  <a:srgbClr val="FFFFFF"/>
+                </a:solidFill>
+              </a14:hiddenFill>
+            </a:ext>
+          </a:extLst>
+        </p:spPr>
+      </p:pic>
+      <p:pic>
+        <p:nvPicPr>
+          <p:cNvPr id="1034" name="Picture 10" descr="UHPPOTE ANSI Standard Heavy Duty Electric Strike Lock Fail Secure for Door  Access Control System Mortise or Cylindrical Lock - - Amazon.com">
+            <a:extLst>
+              <a:ext uri="{FF2B5EF4-FFF2-40B4-BE49-F238E27FC236}">
+                <a16:creationId xmlns:a16="http://schemas.microsoft.com/office/drawing/2014/main" id="{9C3A0A38-8470-4CC1-8E02-2039866F9118}"/>
+              </a:ext>
+            </a:extLst>
+          </p:cNvPr>
+          <p:cNvPicPr>
+            <a:picLocks noChangeAspect="1" noChangeArrowheads="1"/>
+          </p:cNvPicPr>
+          <p:nvPr/>
+        </p:nvPicPr>
+        <p:blipFill>
+          <a:blip r:embed="rId6" cstate="print">
+            <a:extLst>
+              <a:ext uri="{28A0092B-C50C-407E-A947-70E740481C1C}">
+                <a14:useLocalDpi xmlns:a14="http://schemas.microsoft.com/office/drawing/2010/main" val="0"/>
+              </a:ext>
+            </a:extLst>
+          </a:blip>
+          <a:srcRect/>
+          <a:stretch>
+            <a:fillRect/>
+          </a:stretch>
+        </p:blipFill>
+        <p:spPr bwMode="auto">
+          <a:xfrm>
+            <a:off x="11986800" y="19987264"/>
+            <a:ext cx="3654272" cy="2679610"/>
+          </a:xfrm>
+          <a:prstGeom prst="rect">
+            <a:avLst/>
+          </a:prstGeom>
+          <a:noFill/>
+          <a:extLst>
+            <a:ext uri="{909E8E84-426E-40DD-AFC4-6F175D3DCCD1}">
+              <a14:hiddenFill xmlns:a14="http://schemas.microsoft.com/office/drawing/2010/main">
+                <a:solidFill>
+                  <a:srgbClr val="FFFFFF"/>
+                </a:solidFill>
+              </a14:hiddenFill>
+            </a:ext>
+          </a:extLst>
+        </p:spPr>
+      </p:pic>
+      <p:pic>
+        <p:nvPicPr>
+          <p:cNvPr id="1036" name="Picture 12" descr="Secured package flat icon Royalty Free Vector Image">
+            <a:extLst>
+              <a:ext uri="{FF2B5EF4-FFF2-40B4-BE49-F238E27FC236}">
+                <a16:creationId xmlns:a16="http://schemas.microsoft.com/office/drawing/2014/main" id="{B476D4D0-D319-44CB-B620-4BEE59F8E33F}"/>
+              </a:ext>
+            </a:extLst>
+          </p:cNvPr>
+          <p:cNvPicPr>
+            <a:picLocks noChangeAspect="1" noChangeArrowheads="1"/>
+          </p:cNvPicPr>
+          <p:nvPr/>
+        </p:nvPicPr>
+        <p:blipFill rotWithShape="1">
+          <a:blip r:embed="rId7" cstate="print">
+            <a:extLst>
+              <a:ext uri="{28A0092B-C50C-407E-A947-70E740481C1C}">
+                <a14:useLocalDpi xmlns:a14="http://schemas.microsoft.com/office/drawing/2010/main" val="0"/>
+              </a:ext>
+            </a:extLst>
+          </a:blip>
+          <a:srcRect l="17201" t="10000" r="17199" b="32963"/>
+          <a:stretch/>
+        </p:blipFill>
+        <p:spPr bwMode="auto">
+          <a:xfrm>
+            <a:off x="17692914" y="19413280"/>
+            <a:ext cx="3464867" cy="3253594"/>
+          </a:xfrm>
+          <a:prstGeom prst="rect">
+            <a:avLst/>
+          </a:prstGeom>
+          <a:noFill/>
+          <a:extLst>
+            <a:ext uri="{909E8E84-426E-40DD-AFC4-6F175D3DCCD1}">
+              <a14:hiddenFill xmlns:a14="http://schemas.microsoft.com/office/drawing/2010/main">
+                <a:solidFill>
+                  <a:srgbClr val="FFFFFF"/>
+                </a:solidFill>
+              </a14:hiddenFill>
+            </a:ext>
+          </a:extLst>
+        </p:spPr>
+      </p:pic>
+      <p:pic>
+        <p:nvPicPr>
+          <p:cNvPr id="1038" name="Picture 14" descr="Web Application vs Website - What&amp;#39;s the Difference?">
+            <a:extLst>
+              <a:ext uri="{FF2B5EF4-FFF2-40B4-BE49-F238E27FC236}">
+                <a16:creationId xmlns:a16="http://schemas.microsoft.com/office/drawing/2014/main" id="{C6355CA9-383B-4530-A3F4-984E0B4F16D8}"/>
+              </a:ext>
+            </a:extLst>
+          </p:cNvPr>
+          <p:cNvPicPr>
+            <a:picLocks noChangeAspect="1" noChangeArrowheads="1"/>
+          </p:cNvPicPr>
+          <p:nvPr/>
+        </p:nvPicPr>
+        <p:blipFill rotWithShape="1">
+          <a:blip r:embed="rId8">
+            <a:extLst>
+              <a:ext uri="{28A0092B-C50C-407E-A947-70E740481C1C}">
+                <a14:useLocalDpi xmlns:a14="http://schemas.microsoft.com/office/drawing/2010/main" val="0"/>
+              </a:ext>
+            </a:extLst>
+          </a:blip>
+          <a:srcRect l="5334" t="18019" r="55333" b="8825"/>
+          <a:stretch/>
+        </p:blipFill>
+        <p:spPr bwMode="auto">
+          <a:xfrm>
+            <a:off x="17678400" y="24058307"/>
+            <a:ext cx="3749040" cy="3951285"/>
+          </a:xfrm>
+          <a:prstGeom prst="rect">
+            <a:avLst/>
+          </a:prstGeom>
+          <a:noFill/>
+          <a:extLst>
+            <a:ext uri="{909E8E84-426E-40DD-AFC4-6F175D3DCCD1}">
+              <a14:hiddenFill xmlns:a14="http://schemas.microsoft.com/office/drawing/2010/main">
+                <a:solidFill>
+                  <a:srgbClr val="FFFFFF"/>
+                </a:solidFill>
+              </a14:hiddenFill>
+            </a:ext>
+          </a:extLst>
+        </p:spPr>
+      </p:pic>
+      <p:sp>
+        <p:nvSpPr>
+          <p:cNvPr id="26" name="TextBox 25">
+            <a:extLst>
+              <a:ext uri="{FF2B5EF4-FFF2-40B4-BE49-F238E27FC236}">
+                <a16:creationId xmlns:a16="http://schemas.microsoft.com/office/drawing/2014/main" id="{3CFC9C93-C2AA-49F2-B2A5-A0F9E5AE8E99}"/>
+              </a:ext>
+            </a:extLst>
+          </p:cNvPr>
+          <p:cNvSpPr txBox="1"/>
+          <p:nvPr/>
+        </p:nvSpPr>
+        <p:spPr>
+          <a:xfrm>
+            <a:off x="17827807" y="22593149"/>
+            <a:ext cx="3749040" cy="769441"/>
+          </a:xfrm>
+          <a:prstGeom prst="rect">
+            <a:avLst/>
+          </a:prstGeom>
+          <a:noFill/>
+        </p:spPr>
+        <p:txBody>
+          <a:bodyPr wrap="square" rtlCol="0">
+            <a:spAutoFit/>
+          </a:bodyPr>
+          <a:lstStyle/>
+          <a:p>
+            <a:r>
+              <a:rPr lang="en-US" sz="4400" dirty="0"/>
+              <a:t>Secure Package</a:t>
+            </a:r>
+          </a:p>
+        </p:txBody>
+      </p:sp>
+      <p:sp>
+        <p:nvSpPr>
+          <p:cNvPr id="27" name="TextBox 26">
+            <a:extLst>
+              <a:ext uri="{FF2B5EF4-FFF2-40B4-BE49-F238E27FC236}">
+                <a16:creationId xmlns:a16="http://schemas.microsoft.com/office/drawing/2014/main" id="{7B897812-33F3-47B2-ADE4-FAAD2232D32C}"/>
+              </a:ext>
+            </a:extLst>
+          </p:cNvPr>
+          <p:cNvSpPr txBox="1"/>
+          <p:nvPr/>
+        </p:nvSpPr>
+        <p:spPr>
+          <a:xfrm>
+            <a:off x="11867018" y="22593149"/>
+            <a:ext cx="4048522" cy="769441"/>
+          </a:xfrm>
+          <a:prstGeom prst="rect">
+            <a:avLst/>
+          </a:prstGeom>
+          <a:noFill/>
+        </p:spPr>
+        <p:txBody>
+          <a:bodyPr wrap="square" rtlCol="0">
+            <a:spAutoFit/>
+          </a:bodyPr>
+          <a:lstStyle/>
+          <a:p>
+            <a:r>
+              <a:rPr lang="en-US" sz="4400" dirty="0"/>
+              <a:t>Lock Mechanism</a:t>
+            </a:r>
+          </a:p>
+        </p:txBody>
+      </p:sp>
+      <p:sp>
+        <p:nvSpPr>
+          <p:cNvPr id="33" name="Arrow: Right 32">
+            <a:extLst>
+              <a:ext uri="{FF2B5EF4-FFF2-40B4-BE49-F238E27FC236}">
+                <a16:creationId xmlns:a16="http://schemas.microsoft.com/office/drawing/2014/main" id="{688694AC-A044-45D9-A691-FD8DE8D53181}"/>
+              </a:ext>
+            </a:extLst>
+          </p:cNvPr>
+          <p:cNvSpPr/>
+          <p:nvPr/>
+        </p:nvSpPr>
+        <p:spPr>
+          <a:xfrm>
+            <a:off x="15773400" y="20601958"/>
+            <a:ext cx="1683494" cy="876239"/>
+          </a:xfrm>
+          <a:prstGeom prst="rightArrow">
+            <a:avLst/>
+          </a:prstGeom>
+        </p:spPr>
+        <p:style>
+          <a:lnRef idx="2">
+            <a:schemeClr val="accent1">
+              <a:shade val="50000"/>
+            </a:schemeClr>
+          </a:lnRef>
+          <a:fillRef idx="1">
+            <a:schemeClr val="accent1"/>
+          </a:fillRef>
+          <a:effectRef idx="0">
+            <a:schemeClr val="accent1"/>
+          </a:effectRef>
+          <a:fontRef idx="minor">
+            <a:schemeClr val="lt1"/>
+          </a:fontRef>
+        </p:style>
+        <p:txBody>
+          <a:bodyPr rtlCol="0" anchor="ctr"/>
+          <a:lstStyle/>
+          <a:p>
+            <a:pPr algn="ctr"/>
+            <a:endParaRPr lang="en-US"/>
+          </a:p>
+        </p:txBody>
+      </p:sp>
+      <p:pic>
+        <p:nvPicPr>
+          <p:cNvPr id="1042" name="Picture 18" descr="Raspberry Pi 3 Model B | The Pi Hut">
+            <a:extLst>
+              <a:ext uri="{FF2B5EF4-FFF2-40B4-BE49-F238E27FC236}">
+                <a16:creationId xmlns:a16="http://schemas.microsoft.com/office/drawing/2014/main" id="{679824B7-7371-4CF0-A625-98E9738DADBF}"/>
+              </a:ext>
+            </a:extLst>
+          </p:cNvPr>
+          <p:cNvPicPr>
+            <a:picLocks noChangeAspect="1" noChangeArrowheads="1"/>
+          </p:cNvPicPr>
+          <p:nvPr/>
+        </p:nvPicPr>
+        <p:blipFill rotWithShape="1">
+          <a:blip r:embed="rId9">
+            <a:extLst>
+              <a:ext uri="{28A0092B-C50C-407E-A947-70E740481C1C}">
+                <a14:useLocalDpi xmlns:a14="http://schemas.microsoft.com/office/drawing/2010/main" val="0"/>
+              </a:ext>
+            </a:extLst>
+          </a:blip>
+          <a:srcRect t="18000" b="14611"/>
+          <a:stretch/>
+        </p:blipFill>
+        <p:spPr bwMode="auto">
+          <a:xfrm rot="16200000">
+            <a:off x="3439782" y="21055224"/>
+            <a:ext cx="8213453" cy="5534947"/>
+          </a:xfrm>
+          <a:prstGeom prst="rect">
+            <a:avLst/>
+          </a:prstGeom>
+          <a:noFill/>
+          <a:extLst>
+            <a:ext uri="{909E8E84-426E-40DD-AFC4-6F175D3DCCD1}">
+              <a14:hiddenFill xmlns:a14="http://schemas.microsoft.com/office/drawing/2010/main">
+                <a:solidFill>
+                  <a:srgbClr val="FFFFFF"/>
+                </a:solidFill>
+              </a14:hiddenFill>
+            </a:ext>
+          </a:extLst>
+        </p:spPr>
+      </p:pic>
+      <p:sp>
+        <p:nvSpPr>
+          <p:cNvPr id="38" name="Arrow: Right 37">
+            <a:extLst>
+              <a:ext uri="{FF2B5EF4-FFF2-40B4-BE49-F238E27FC236}">
+                <a16:creationId xmlns:a16="http://schemas.microsoft.com/office/drawing/2014/main" id="{18F3100F-0E74-4E9C-A062-997A2AD77CE8}"/>
+              </a:ext>
+            </a:extLst>
+          </p:cNvPr>
+          <p:cNvSpPr/>
+          <p:nvPr/>
+        </p:nvSpPr>
+        <p:spPr>
+          <a:xfrm>
+            <a:off x="10185296" y="20601958"/>
+            <a:ext cx="1683494" cy="876239"/>
+          </a:xfrm>
+          <a:prstGeom prst="rightArrow">
+            <a:avLst/>
+          </a:prstGeom>
+        </p:spPr>
+        <p:style>
+          <a:lnRef idx="2">
+            <a:schemeClr val="accent1">
+              <a:shade val="50000"/>
+            </a:schemeClr>
+          </a:lnRef>
+          <a:fillRef idx="1">
+            <a:schemeClr val="accent1"/>
+          </a:fillRef>
+          <a:effectRef idx="0">
+            <a:schemeClr val="accent1"/>
+          </a:effectRef>
+          <a:fontRef idx="minor">
+            <a:schemeClr val="lt1"/>
+          </a:fontRef>
+        </p:style>
+        <p:txBody>
+          <a:bodyPr rtlCol="0" anchor="ctr"/>
+          <a:lstStyle/>
+          <a:p>
+            <a:pPr algn="ctr"/>
+            <a:endParaRPr lang="en-US"/>
+          </a:p>
+        </p:txBody>
+      </p:sp>
+      <p:sp>
+        <p:nvSpPr>
+          <p:cNvPr id="39" name="Arrow: Right 38">
+            <a:extLst>
+              <a:ext uri="{FF2B5EF4-FFF2-40B4-BE49-F238E27FC236}">
+                <a16:creationId xmlns:a16="http://schemas.microsoft.com/office/drawing/2014/main" id="{9AF81679-5BE8-41D7-8789-7AB317B9C2A6}"/>
+              </a:ext>
+            </a:extLst>
+          </p:cNvPr>
+          <p:cNvSpPr/>
+          <p:nvPr/>
+        </p:nvSpPr>
+        <p:spPr>
+          <a:xfrm>
+            <a:off x="3048000" y="20601958"/>
+            <a:ext cx="1683494" cy="876239"/>
+          </a:xfrm>
+          <a:prstGeom prst="rightArrow">
+            <a:avLst/>
+          </a:prstGeom>
+        </p:spPr>
+        <p:style>
+          <a:lnRef idx="2">
+            <a:schemeClr val="accent1">
+              <a:shade val="50000"/>
+            </a:schemeClr>
+          </a:lnRef>
+          <a:fillRef idx="1">
+            <a:schemeClr val="accent1"/>
+          </a:fillRef>
+          <a:effectRef idx="0">
+            <a:schemeClr val="accent1"/>
+          </a:effectRef>
+          <a:fontRef idx="minor">
+            <a:schemeClr val="lt1"/>
+          </a:fontRef>
+        </p:style>
+        <p:txBody>
+          <a:bodyPr rtlCol="0" anchor="ctr"/>
+          <a:lstStyle/>
+          <a:p>
+            <a:pPr algn="ctr"/>
+            <a:endParaRPr lang="en-US"/>
+          </a:p>
+        </p:txBody>
+      </p:sp>
+      <p:sp>
+        <p:nvSpPr>
+          <p:cNvPr id="40" name="Arrow: Right 39">
+            <a:extLst>
+              <a:ext uri="{FF2B5EF4-FFF2-40B4-BE49-F238E27FC236}">
+                <a16:creationId xmlns:a16="http://schemas.microsoft.com/office/drawing/2014/main" id="{7BFB75FF-6B29-45B6-9023-E9E9E7D7C57D}"/>
+              </a:ext>
+            </a:extLst>
+          </p:cNvPr>
+          <p:cNvSpPr/>
+          <p:nvPr/>
+        </p:nvSpPr>
+        <p:spPr>
+          <a:xfrm>
+            <a:off x="10170978" y="25857381"/>
+            <a:ext cx="1544352" cy="876239"/>
+          </a:xfrm>
+          <a:prstGeom prst="rightArrow">
+            <a:avLst/>
+          </a:prstGeom>
+        </p:spPr>
+        <p:style>
+          <a:lnRef idx="2">
+            <a:schemeClr val="accent1">
+              <a:shade val="50000"/>
+            </a:schemeClr>
+          </a:lnRef>
+          <a:fillRef idx="1">
+            <a:schemeClr val="accent1"/>
+          </a:fillRef>
+          <a:effectRef idx="0">
+            <a:schemeClr val="accent1"/>
+          </a:effectRef>
+          <a:fontRef idx="minor">
+            <a:schemeClr val="lt1"/>
+          </a:fontRef>
+        </p:style>
+        <p:txBody>
+          <a:bodyPr rtlCol="0" anchor="ctr"/>
+          <a:lstStyle/>
+          <a:p>
+            <a:pPr algn="ctr"/>
+            <a:endParaRPr lang="en-US"/>
+          </a:p>
+        </p:txBody>
+      </p:sp>
+      <p:sp>
+        <p:nvSpPr>
+          <p:cNvPr id="41" name="Arrow: Right 40">
+            <a:extLst>
+              <a:ext uri="{FF2B5EF4-FFF2-40B4-BE49-F238E27FC236}">
+                <a16:creationId xmlns:a16="http://schemas.microsoft.com/office/drawing/2014/main" id="{3CF75532-50F2-49B5-8ADF-DD7330D02504}"/>
+              </a:ext>
+            </a:extLst>
+          </p:cNvPr>
+          <p:cNvSpPr/>
+          <p:nvPr/>
+        </p:nvSpPr>
+        <p:spPr>
+          <a:xfrm>
+            <a:off x="15981648" y="25857380"/>
+            <a:ext cx="1544352" cy="876239"/>
+          </a:xfrm>
+          <a:prstGeom prst="rightArrow">
+            <a:avLst/>
+          </a:prstGeom>
+        </p:spPr>
+        <p:style>
+          <a:lnRef idx="2">
+            <a:schemeClr val="accent1">
+              <a:shade val="50000"/>
+            </a:schemeClr>
+          </a:lnRef>
+          <a:fillRef idx="1">
+            <a:schemeClr val="accent1"/>
+          </a:fillRef>
+          <a:effectRef idx="0">
+            <a:schemeClr val="accent1"/>
+          </a:effectRef>
+          <a:fontRef idx="minor">
+            <a:schemeClr val="lt1"/>
+          </a:fontRef>
+        </p:style>
+        <p:txBody>
+          <a:bodyPr rtlCol="0" anchor="ctr"/>
+          <a:lstStyle/>
+          <a:p>
+            <a:pPr algn="ctr"/>
+            <a:endParaRPr lang="en-US"/>
+          </a:p>
+        </p:txBody>
+      </p:sp>
+      <p:sp>
+        <p:nvSpPr>
+          <p:cNvPr id="42" name="Arrow: Right 41">
+            <a:extLst>
+              <a:ext uri="{FF2B5EF4-FFF2-40B4-BE49-F238E27FC236}">
+                <a16:creationId xmlns:a16="http://schemas.microsoft.com/office/drawing/2014/main" id="{85B8760B-0435-4723-9224-29DF653B2420}"/>
+              </a:ext>
+            </a:extLst>
+          </p:cNvPr>
+          <p:cNvSpPr/>
+          <p:nvPr/>
+        </p:nvSpPr>
+        <p:spPr>
+          <a:xfrm>
+            <a:off x="3152157" y="25857380"/>
+            <a:ext cx="1544352" cy="876239"/>
+          </a:xfrm>
+          <a:prstGeom prst="rightArrow">
+            <a:avLst/>
+          </a:prstGeom>
+        </p:spPr>
+        <p:style>
+          <a:lnRef idx="2">
+            <a:schemeClr val="accent1">
+              <a:shade val="50000"/>
+            </a:schemeClr>
+          </a:lnRef>
+          <a:fillRef idx="1">
+            <a:schemeClr val="accent1"/>
+          </a:fillRef>
+          <a:effectRef idx="0">
+            <a:schemeClr val="accent1"/>
+          </a:effectRef>
+          <a:fontRef idx="minor">
+            <a:schemeClr val="lt1"/>
+          </a:fontRef>
+        </p:style>
+        <p:txBody>
+          <a:bodyPr rtlCol="0" anchor="ctr"/>
+          <a:lstStyle/>
+          <a:p>
+            <a:pPr algn="ctr"/>
+            <a:endParaRPr lang="en-US"/>
+          </a:p>
+        </p:txBody>
+      </p:sp>
+      <p:sp>
+        <p:nvSpPr>
+          <p:cNvPr id="43" name="TextBox 42">
+            <a:extLst>
+              <a:ext uri="{FF2B5EF4-FFF2-40B4-BE49-F238E27FC236}">
+                <a16:creationId xmlns:a16="http://schemas.microsoft.com/office/drawing/2014/main" id="{3FA78939-A823-43C6-B2A9-6D0FCEF45758}"/>
+              </a:ext>
+            </a:extLst>
+          </p:cNvPr>
+          <p:cNvSpPr txBox="1"/>
+          <p:nvPr/>
+        </p:nvSpPr>
+        <p:spPr>
+          <a:xfrm>
+            <a:off x="749355" y="22787624"/>
+            <a:ext cx="1948061" cy="769441"/>
+          </a:xfrm>
+          <a:prstGeom prst="rect">
+            <a:avLst/>
+          </a:prstGeom>
+          <a:noFill/>
+        </p:spPr>
+        <p:txBody>
+          <a:bodyPr wrap="square" rtlCol="0">
+            <a:spAutoFit/>
+          </a:bodyPr>
+          <a:lstStyle/>
+          <a:p>
+            <a:r>
+              <a:rPr lang="en-US" sz="4400" dirty="0"/>
+              <a:t>Keypad</a:t>
+            </a:r>
+          </a:p>
+        </p:txBody>
+      </p:sp>
+      <p:sp>
+        <p:nvSpPr>
+          <p:cNvPr id="44" name="TextBox 43">
+            <a:extLst>
+              <a:ext uri="{FF2B5EF4-FFF2-40B4-BE49-F238E27FC236}">
+                <a16:creationId xmlns:a16="http://schemas.microsoft.com/office/drawing/2014/main" id="{C56C61B9-E212-440B-B2FC-4E302F16C631}"/>
+              </a:ext>
+            </a:extLst>
+          </p:cNvPr>
+          <p:cNvSpPr txBox="1"/>
+          <p:nvPr/>
+        </p:nvSpPr>
+        <p:spPr>
+          <a:xfrm>
+            <a:off x="718939" y="27368847"/>
+            <a:ext cx="1948061" cy="769441"/>
+          </a:xfrm>
+          <a:prstGeom prst="rect">
+            <a:avLst/>
+          </a:prstGeom>
+          <a:noFill/>
+        </p:spPr>
+        <p:txBody>
+          <a:bodyPr wrap="square" rtlCol="0">
+            <a:spAutoFit/>
+          </a:bodyPr>
+          <a:lstStyle/>
+          <a:p>
+            <a:r>
+              <a:rPr lang="en-US" sz="4400" dirty="0"/>
+              <a:t>Camera</a:t>
+            </a:r>
+          </a:p>
+        </p:txBody>
+      </p:sp>
+      <p:sp>
+        <p:nvSpPr>
+          <p:cNvPr id="45" name="TextBox 44">
+            <a:extLst>
+              <a:ext uri="{FF2B5EF4-FFF2-40B4-BE49-F238E27FC236}">
+                <a16:creationId xmlns:a16="http://schemas.microsoft.com/office/drawing/2014/main" id="{370C6517-07A4-49F3-8159-97B5284FF475}"/>
+              </a:ext>
+            </a:extLst>
+          </p:cNvPr>
+          <p:cNvSpPr txBox="1"/>
+          <p:nvPr/>
+        </p:nvSpPr>
+        <p:spPr>
+          <a:xfrm>
+            <a:off x="5946308" y="27753567"/>
+            <a:ext cx="3200400" cy="769441"/>
+          </a:xfrm>
+          <a:prstGeom prst="rect">
+            <a:avLst/>
+          </a:prstGeom>
+          <a:noFill/>
+        </p:spPr>
+        <p:txBody>
+          <a:bodyPr wrap="square" rtlCol="0">
+            <a:spAutoFit/>
+          </a:bodyPr>
+          <a:lstStyle/>
+          <a:p>
+            <a:r>
+              <a:rPr lang="en-US" sz="4400" dirty="0"/>
+              <a:t>Raspberry Pi</a:t>
+            </a:r>
+          </a:p>
+        </p:txBody>
+      </p:sp>
+      <p:sp>
+        <p:nvSpPr>
+          <p:cNvPr id="46" name="TextBox 45">
+            <a:extLst>
+              <a:ext uri="{FF2B5EF4-FFF2-40B4-BE49-F238E27FC236}">
+                <a16:creationId xmlns:a16="http://schemas.microsoft.com/office/drawing/2014/main" id="{A4266DD8-5702-4C8E-A9EE-51A1EF8C0825}"/>
+              </a:ext>
+            </a:extLst>
+          </p:cNvPr>
+          <p:cNvSpPr txBox="1"/>
+          <p:nvPr/>
+        </p:nvSpPr>
+        <p:spPr>
+          <a:xfrm>
+            <a:off x="12101417" y="27413444"/>
+            <a:ext cx="3349993" cy="769441"/>
+          </a:xfrm>
+          <a:prstGeom prst="rect">
+            <a:avLst/>
+          </a:prstGeom>
+          <a:noFill/>
+        </p:spPr>
+        <p:txBody>
+          <a:bodyPr wrap="square" rtlCol="0">
+            <a:spAutoFit/>
+          </a:bodyPr>
+          <a:lstStyle/>
+          <a:p>
+            <a:r>
+              <a:rPr lang="en-US" sz="4400" dirty="0"/>
+              <a:t>Cloud Storage</a:t>
+            </a:r>
+          </a:p>
+        </p:txBody>
+      </p:sp>
+      <p:sp>
+        <p:nvSpPr>
+          <p:cNvPr id="47" name="TextBox 46">
+            <a:extLst>
+              <a:ext uri="{FF2B5EF4-FFF2-40B4-BE49-F238E27FC236}">
+                <a16:creationId xmlns:a16="http://schemas.microsoft.com/office/drawing/2014/main" id="{98621C99-9ABB-4A0E-8F74-AFEFA2B7FEBC}"/>
+              </a:ext>
+            </a:extLst>
+          </p:cNvPr>
+          <p:cNvSpPr txBox="1"/>
+          <p:nvPr/>
+        </p:nvSpPr>
+        <p:spPr>
+          <a:xfrm>
+            <a:off x="17781872" y="27957959"/>
+            <a:ext cx="3554128" cy="769441"/>
+          </a:xfrm>
+          <a:prstGeom prst="rect">
+            <a:avLst/>
+          </a:prstGeom>
+          <a:noFill/>
+        </p:spPr>
+        <p:txBody>
+          <a:bodyPr wrap="square" rtlCol="0">
+            <a:spAutoFit/>
+          </a:bodyPr>
+          <a:lstStyle/>
+          <a:p>
+            <a:r>
+              <a:rPr lang="en-US" sz="4400" dirty="0"/>
+              <a:t>User Interface</a:t>
+            </a:r>
+          </a:p>
+        </p:txBody>
+      </p:sp>
+      <p:sp>
+        <p:nvSpPr>
+          <p:cNvPr id="14" name="TextBox 13">
+            <a:extLst>
+              <a:ext uri="{FF2B5EF4-FFF2-40B4-BE49-F238E27FC236}">
+                <a16:creationId xmlns:a16="http://schemas.microsoft.com/office/drawing/2014/main" id="{F5F59A34-4792-45EF-BD63-3BBB409AD5B1}"/>
+              </a:ext>
+            </a:extLst>
+          </p:cNvPr>
+          <p:cNvSpPr txBox="1"/>
+          <p:nvPr/>
+        </p:nvSpPr>
+        <p:spPr>
+          <a:xfrm>
+            <a:off x="5562600" y="18059400"/>
+            <a:ext cx="10134600" cy="1323439"/>
+          </a:xfrm>
+          <a:prstGeom prst="rect">
+            <a:avLst/>
+          </a:prstGeom>
+          <a:noFill/>
+        </p:spPr>
+        <p:txBody>
+          <a:bodyPr wrap="square" rtlCol="0">
+            <a:spAutoFit/>
+          </a:bodyPr>
+          <a:lstStyle/>
+          <a:p>
+            <a:r>
+              <a:rPr lang="en-US" sz="8000" b="1" dirty="0"/>
+              <a:t>Design of Deliverables</a:t>
+            </a:r>
           </a:p>
         </p:txBody>
       </p:sp>

</xml_diff>